<commit_message>
just updated by some small explainations
</commit_message>
<xml_diff>
--- a/Presentation/ShapeFromX_v1.pptx
+++ b/Presentation/ShapeFromX_v1.pptx
@@ -9,10 +9,21 @@
     <p:sldId id="257" r:id="rId3"/>
     <p:sldId id="263" r:id="rId4"/>
     <p:sldId id="262" r:id="rId5"/>
-    <p:sldId id="258" r:id="rId6"/>
-    <p:sldId id="259" r:id="rId7"/>
-    <p:sldId id="260" r:id="rId8"/>
+    <p:sldId id="260" r:id="rId6"/>
+    <p:sldId id="258" r:id="rId7"/>
+    <p:sldId id="259" r:id="rId8"/>
     <p:sldId id="261" r:id="rId9"/>
+    <p:sldId id="264" r:id="rId10"/>
+    <p:sldId id="265" r:id="rId11"/>
+    <p:sldId id="266" r:id="rId12"/>
+    <p:sldId id="267" r:id="rId13"/>
+    <p:sldId id="268" r:id="rId14"/>
+    <p:sldId id="269" r:id="rId15"/>
+    <p:sldId id="270" r:id="rId16"/>
+    <p:sldId id="271" r:id="rId17"/>
+    <p:sldId id="272" r:id="rId18"/>
+    <p:sldId id="273" r:id="rId19"/>
+    <p:sldId id="274" r:id="rId20"/>
   </p:sldIdLst>
   <p:sldSz cx="12192000" cy="6858000"/>
   <p:notesSz cx="6858000" cy="9144000"/>
@@ -258,7 +269,7 @@
           <a:p>
             <a:fld id="{423F7160-6081-4D8F-90A5-861E05C76F25}" type="datetimeFigureOut">
               <a:rPr lang="en-US" smtClean="0"/>
-              <a:t>28-Oct-23</a:t>
+              <a:t>30-Oct-23</a:t>
             </a:fld>
             <a:endParaRPr lang="en-US"/>
           </a:p>
@@ -469,7 +480,7 @@
           <a:p>
             <a:fld id="{423F7160-6081-4D8F-90A5-861E05C76F25}" type="datetimeFigureOut">
               <a:rPr lang="en-US" smtClean="0"/>
-              <a:t>28-Oct-23</a:t>
+              <a:t>30-Oct-23</a:t>
             </a:fld>
             <a:endParaRPr lang="en-US"/>
           </a:p>
@@ -684,7 +695,7 @@
           <a:p>
             <a:fld id="{423F7160-6081-4D8F-90A5-861E05C76F25}" type="datetimeFigureOut">
               <a:rPr lang="en-US" smtClean="0"/>
-              <a:t>28-Oct-23</a:t>
+              <a:t>30-Oct-23</a:t>
             </a:fld>
             <a:endParaRPr lang="en-US"/>
           </a:p>
@@ -885,7 +896,7 @@
           <a:p>
             <a:fld id="{423F7160-6081-4D8F-90A5-861E05C76F25}" type="datetimeFigureOut">
               <a:rPr lang="en-US" smtClean="0"/>
-              <a:t>28-Oct-23</a:t>
+              <a:t>30-Oct-23</a:t>
             </a:fld>
             <a:endParaRPr lang="en-US"/>
           </a:p>
@@ -1164,7 +1175,7 @@
           <a:p>
             <a:fld id="{423F7160-6081-4D8F-90A5-861E05C76F25}" type="datetimeFigureOut">
               <a:rPr lang="en-US" smtClean="0"/>
-              <a:t>28-Oct-23</a:t>
+              <a:t>30-Oct-23</a:t>
             </a:fld>
             <a:endParaRPr lang="en-US"/>
           </a:p>
@@ -1432,7 +1443,7 @@
           <a:p>
             <a:fld id="{423F7160-6081-4D8F-90A5-861E05C76F25}" type="datetimeFigureOut">
               <a:rPr lang="en-US" smtClean="0"/>
-              <a:t>28-Oct-23</a:t>
+              <a:t>30-Oct-23</a:t>
             </a:fld>
             <a:endParaRPr lang="en-US"/>
           </a:p>
@@ -1848,7 +1859,7 @@
           <a:p>
             <a:fld id="{423F7160-6081-4D8F-90A5-861E05C76F25}" type="datetimeFigureOut">
               <a:rPr lang="en-US" smtClean="0"/>
-              <a:t>28-Oct-23</a:t>
+              <a:t>30-Oct-23</a:t>
             </a:fld>
             <a:endParaRPr lang="en-US"/>
           </a:p>
@@ -1997,7 +2008,7 @@
           <a:p>
             <a:fld id="{423F7160-6081-4D8F-90A5-861E05C76F25}" type="datetimeFigureOut">
               <a:rPr lang="en-US" smtClean="0"/>
-              <a:t>28-Oct-23</a:t>
+              <a:t>30-Oct-23</a:t>
             </a:fld>
             <a:endParaRPr lang="en-US"/>
           </a:p>
@@ -2123,7 +2134,7 @@
           <a:p>
             <a:fld id="{423F7160-6081-4D8F-90A5-861E05C76F25}" type="datetimeFigureOut">
               <a:rPr lang="en-US" smtClean="0"/>
-              <a:t>28-Oct-23</a:t>
+              <a:t>30-Oct-23</a:t>
             </a:fld>
             <a:endParaRPr lang="en-US"/>
           </a:p>
@@ -2374,7 +2385,7 @@
           <a:p>
             <a:fld id="{423F7160-6081-4D8F-90A5-861E05C76F25}" type="datetimeFigureOut">
               <a:rPr lang="en-US" smtClean="0"/>
-              <a:t>28-Oct-23</a:t>
+              <a:t>30-Oct-23</a:t>
             </a:fld>
             <a:endParaRPr lang="en-US"/>
           </a:p>
@@ -2819,7 +2830,7 @@
           <a:p>
             <a:fld id="{423F7160-6081-4D8F-90A5-861E05C76F25}" type="datetimeFigureOut">
               <a:rPr lang="en-US" smtClean="0"/>
-              <a:t>28-Oct-23</a:t>
+              <a:t>30-Oct-23</a:t>
             </a:fld>
             <a:endParaRPr lang="en-US"/>
           </a:p>
@@ -3146,7 +3157,7 @@
           <a:p>
             <a:fld id="{423F7160-6081-4D8F-90A5-861E05C76F25}" type="datetimeFigureOut">
               <a:rPr lang="en-US" smtClean="0"/>
-              <a:t>28-Oct-23</a:t>
+              <a:t>30-Oct-23</a:t>
             </a:fld>
             <a:endParaRPr lang="en-US"/>
           </a:p>
@@ -3679,28 +3690,28 @@
         <p:spPr/>
         <p:txBody>
           <a:bodyPr>
-            <a:normAutofit fontScale="62500" lnSpcReduction="20000"/>
+            <a:noAutofit/>
           </a:bodyPr>
           <a:lstStyle/>
           <a:p>
             <a:r>
-              <a:rPr lang="en-US" dirty="0"/>
+              <a:rPr lang="en-US" sz="2000" dirty="0"/>
               <a:t>Computer vision class</a:t>
             </a:r>
           </a:p>
           <a:p>
             <a:r>
-              <a:rPr lang="en-US" dirty="0"/>
+              <a:rPr lang="en-US" sz="2000" dirty="0"/>
               <a:t>Guided by: Dr. Sabri</a:t>
             </a:r>
           </a:p>
           <a:p>
             <a:r>
-              <a:rPr lang="en-US" dirty="0" err="1"/>
+              <a:rPr lang="en-US" sz="2000" dirty="0" err="1"/>
               <a:t>Presentor</a:t>
             </a:r>
             <a:r>
-              <a:rPr lang="en-US" dirty="0"/>
+              <a:rPr lang="en-US" sz="2000" dirty="0"/>
               <a:t>: Heydar Mahmoodi</a:t>
             </a:r>
           </a:p>
@@ -3710,6 +3721,1078 @@
     <p:extLst>
       <p:ext uri="{BB962C8B-B14F-4D97-AF65-F5344CB8AC3E}">
         <p14:creationId xmlns:p14="http://schemas.microsoft.com/office/powerpoint/2010/main" val="4133972187"/>
+      </p:ext>
+    </p:extLst>
+  </p:cSld>
+  <p:clrMapOvr>
+    <a:masterClrMapping/>
+  </p:clrMapOvr>
+</p:sld>
+</file>
+
+<file path=ppt/slides/slide10.xml><?xml version="1.0" encoding="utf-8"?>
+<p:sld xmlns:a="http://schemas.openxmlformats.org/drawingml/2006/main" xmlns:r="http://schemas.openxmlformats.org/officeDocument/2006/relationships" xmlns:p="http://schemas.openxmlformats.org/presentationml/2006/main">
+  <p:cSld>
+    <p:spTree>
+      <p:nvGrpSpPr>
+        <p:cNvPr id="1" name=""/>
+        <p:cNvGrpSpPr/>
+        <p:nvPr/>
+      </p:nvGrpSpPr>
+      <p:grpSpPr>
+        <a:xfrm>
+          <a:off x="0" y="0"/>
+          <a:ext cx="0" cy="0"/>
+          <a:chOff x="0" y="0"/>
+          <a:chExt cx="0" cy="0"/>
+        </a:xfrm>
+      </p:grpSpPr>
+      <p:sp>
+        <p:nvSpPr>
+          <p:cNvPr id="2" name="Title 1">
+            <a:extLst>
+              <a:ext uri="{FF2B5EF4-FFF2-40B4-BE49-F238E27FC236}">
+                <a16:creationId xmlns:a16="http://schemas.microsoft.com/office/drawing/2014/main" id="{5C99E018-CA84-5138-856C-B3E830B88330}"/>
+              </a:ext>
+            </a:extLst>
+          </p:cNvPr>
+          <p:cNvSpPr>
+            <a:spLocks noGrp="1"/>
+          </p:cNvSpPr>
+          <p:nvPr>
+            <p:ph type="title"/>
+          </p:nvPr>
+        </p:nvSpPr>
+        <p:spPr/>
+        <p:txBody>
+          <a:bodyPr/>
+          <a:lstStyle/>
+          <a:p>
+            <a:r>
+              <a:rPr lang="en-US" b="1" i="0" dirty="0">
+                <a:effectLst/>
+                <a:latin typeface="Söhne"/>
+              </a:rPr>
+              <a:t>Shape from Stereopsis</a:t>
+            </a:r>
+            <a:endParaRPr lang="en-US" dirty="0"/>
+          </a:p>
+        </p:txBody>
+      </p:sp>
+      <p:sp>
+        <p:nvSpPr>
+          <p:cNvPr id="3" name="Content Placeholder 2">
+            <a:extLst>
+              <a:ext uri="{FF2B5EF4-FFF2-40B4-BE49-F238E27FC236}">
+                <a16:creationId xmlns:a16="http://schemas.microsoft.com/office/drawing/2014/main" id="{ED75E2D9-0EFC-1CA7-0AF3-71CF612D3DCE}"/>
+              </a:ext>
+            </a:extLst>
+          </p:cNvPr>
+          <p:cNvSpPr>
+            <a:spLocks noGrp="1"/>
+          </p:cNvSpPr>
+          <p:nvPr>
+            <p:ph idx="1"/>
+          </p:nvPr>
+        </p:nvSpPr>
+        <p:spPr/>
+        <p:txBody>
+          <a:bodyPr/>
+          <a:lstStyle/>
+          <a:p>
+            <a:pPr marL="0" indent="0">
+              <a:buNone/>
+            </a:pPr>
+            <a:r>
+              <a:rPr lang="en-US" b="0" i="0" dirty="0">
+                <a:solidFill>
+                  <a:srgbClr val="374151"/>
+                </a:solidFill>
+                <a:effectLst/>
+                <a:latin typeface="Söhne"/>
+              </a:rPr>
+              <a:t>Determining the 3D structure of objects by comparing the disparities or differences in the images seen by both eyes, which is the basis of human stereoscopic vision.</a:t>
+            </a:r>
+          </a:p>
+          <a:p>
+            <a:pPr marL="0" indent="0">
+              <a:buNone/>
+            </a:pPr>
+            <a:endParaRPr lang="en-US" dirty="0"/>
+          </a:p>
+        </p:txBody>
+      </p:sp>
+    </p:spTree>
+    <p:extLst>
+      <p:ext uri="{BB962C8B-B14F-4D97-AF65-F5344CB8AC3E}">
+        <p14:creationId xmlns:p14="http://schemas.microsoft.com/office/powerpoint/2010/main" val="2000240616"/>
+      </p:ext>
+    </p:extLst>
+  </p:cSld>
+  <p:clrMapOvr>
+    <a:masterClrMapping/>
+  </p:clrMapOvr>
+</p:sld>
+</file>
+
+<file path=ppt/slides/slide11.xml><?xml version="1.0" encoding="utf-8"?>
+<p:sld xmlns:a="http://schemas.openxmlformats.org/drawingml/2006/main" xmlns:r="http://schemas.openxmlformats.org/officeDocument/2006/relationships" xmlns:p="http://schemas.openxmlformats.org/presentationml/2006/main">
+  <p:cSld>
+    <p:spTree>
+      <p:nvGrpSpPr>
+        <p:cNvPr id="1" name=""/>
+        <p:cNvGrpSpPr/>
+        <p:nvPr/>
+      </p:nvGrpSpPr>
+      <p:grpSpPr>
+        <a:xfrm>
+          <a:off x="0" y="0"/>
+          <a:ext cx="0" cy="0"/>
+          <a:chOff x="0" y="0"/>
+          <a:chExt cx="0" cy="0"/>
+        </a:xfrm>
+      </p:grpSpPr>
+      <p:sp>
+        <p:nvSpPr>
+          <p:cNvPr id="2" name="Title 1">
+            <a:extLst>
+              <a:ext uri="{FF2B5EF4-FFF2-40B4-BE49-F238E27FC236}">
+                <a16:creationId xmlns:a16="http://schemas.microsoft.com/office/drawing/2014/main" id="{04002995-3D8F-0360-8F05-ACF7CBDCEA6B}"/>
+              </a:ext>
+            </a:extLst>
+          </p:cNvPr>
+          <p:cNvSpPr>
+            <a:spLocks noGrp="1"/>
+          </p:cNvSpPr>
+          <p:nvPr>
+            <p:ph type="title"/>
+          </p:nvPr>
+        </p:nvSpPr>
+        <p:spPr/>
+        <p:txBody>
+          <a:bodyPr/>
+          <a:lstStyle/>
+          <a:p>
+            <a:r>
+              <a:rPr lang="en-US" b="1" i="0" dirty="0">
+                <a:effectLst/>
+                <a:latin typeface="Söhne"/>
+              </a:rPr>
+              <a:t>Shape from Reflection</a:t>
+            </a:r>
+            <a:endParaRPr lang="en-US" dirty="0"/>
+          </a:p>
+        </p:txBody>
+      </p:sp>
+      <p:sp>
+        <p:nvSpPr>
+          <p:cNvPr id="3" name="Content Placeholder 2">
+            <a:extLst>
+              <a:ext uri="{FF2B5EF4-FFF2-40B4-BE49-F238E27FC236}">
+                <a16:creationId xmlns:a16="http://schemas.microsoft.com/office/drawing/2014/main" id="{2245B2CB-5B77-9D77-8229-BCEFB91B5AEC}"/>
+              </a:ext>
+            </a:extLst>
+          </p:cNvPr>
+          <p:cNvSpPr>
+            <a:spLocks noGrp="1"/>
+          </p:cNvSpPr>
+          <p:nvPr>
+            <p:ph idx="1"/>
+          </p:nvPr>
+        </p:nvSpPr>
+        <p:spPr/>
+        <p:txBody>
+          <a:bodyPr/>
+          <a:lstStyle/>
+          <a:p>
+            <a:pPr marL="0" indent="0">
+              <a:buNone/>
+            </a:pPr>
+            <a:r>
+              <a:rPr lang="en-US" b="0" i="0" dirty="0">
+                <a:solidFill>
+                  <a:srgbClr val="374151"/>
+                </a:solidFill>
+                <a:effectLst/>
+                <a:latin typeface="Söhne"/>
+              </a:rPr>
+              <a:t>Inferring the shape of an object by examining how it reflects light or other electromagnetic waves.</a:t>
+            </a:r>
+            <a:endParaRPr lang="en-US" dirty="0"/>
+          </a:p>
+        </p:txBody>
+      </p:sp>
+    </p:spTree>
+    <p:extLst>
+      <p:ext uri="{BB962C8B-B14F-4D97-AF65-F5344CB8AC3E}">
+        <p14:creationId xmlns:p14="http://schemas.microsoft.com/office/powerpoint/2010/main" val="160146927"/>
+      </p:ext>
+    </p:extLst>
+  </p:cSld>
+  <p:clrMapOvr>
+    <a:masterClrMapping/>
+  </p:clrMapOvr>
+</p:sld>
+</file>
+
+<file path=ppt/slides/slide12.xml><?xml version="1.0" encoding="utf-8"?>
+<p:sld xmlns:a="http://schemas.openxmlformats.org/drawingml/2006/main" xmlns:r="http://schemas.openxmlformats.org/officeDocument/2006/relationships" xmlns:p="http://schemas.openxmlformats.org/presentationml/2006/main">
+  <p:cSld>
+    <p:spTree>
+      <p:nvGrpSpPr>
+        <p:cNvPr id="1" name=""/>
+        <p:cNvGrpSpPr/>
+        <p:nvPr/>
+      </p:nvGrpSpPr>
+      <p:grpSpPr>
+        <a:xfrm>
+          <a:off x="0" y="0"/>
+          <a:ext cx="0" cy="0"/>
+          <a:chOff x="0" y="0"/>
+          <a:chExt cx="0" cy="0"/>
+        </a:xfrm>
+      </p:grpSpPr>
+      <p:sp>
+        <p:nvSpPr>
+          <p:cNvPr id="2" name="Title 1">
+            <a:extLst>
+              <a:ext uri="{FF2B5EF4-FFF2-40B4-BE49-F238E27FC236}">
+                <a16:creationId xmlns:a16="http://schemas.microsoft.com/office/drawing/2014/main" id="{07166D3D-10E3-3CD1-232F-1899926B55B9}"/>
+              </a:ext>
+            </a:extLst>
+          </p:cNvPr>
+          <p:cNvSpPr>
+            <a:spLocks noGrp="1"/>
+          </p:cNvSpPr>
+          <p:nvPr>
+            <p:ph type="title"/>
+          </p:nvPr>
+        </p:nvSpPr>
+        <p:spPr/>
+        <p:txBody>
+          <a:bodyPr/>
+          <a:lstStyle/>
+          <a:p>
+            <a:r>
+              <a:rPr lang="en-US" b="1" i="0" dirty="0">
+                <a:effectLst/>
+                <a:latin typeface="Söhne"/>
+              </a:rPr>
+              <a:t>Shape from Infrared (</a:t>
+            </a:r>
+            <a:r>
+              <a:rPr lang="en-US" b="1" i="0" dirty="0" err="1">
+                <a:effectLst/>
+                <a:latin typeface="Söhne"/>
+              </a:rPr>
+              <a:t>SfIR</a:t>
+            </a:r>
+            <a:r>
+              <a:rPr lang="en-US" b="1" i="0" dirty="0">
+                <a:effectLst/>
+                <a:latin typeface="Söhne"/>
+              </a:rPr>
+              <a:t>)</a:t>
+            </a:r>
+            <a:endParaRPr lang="en-US" dirty="0"/>
+          </a:p>
+        </p:txBody>
+      </p:sp>
+      <p:sp>
+        <p:nvSpPr>
+          <p:cNvPr id="3" name="Content Placeholder 2">
+            <a:extLst>
+              <a:ext uri="{FF2B5EF4-FFF2-40B4-BE49-F238E27FC236}">
+                <a16:creationId xmlns:a16="http://schemas.microsoft.com/office/drawing/2014/main" id="{C095A36E-A8BE-8479-B860-33CD7161C1BA}"/>
+              </a:ext>
+            </a:extLst>
+          </p:cNvPr>
+          <p:cNvSpPr>
+            <a:spLocks noGrp="1"/>
+          </p:cNvSpPr>
+          <p:nvPr>
+            <p:ph idx="1"/>
+          </p:nvPr>
+        </p:nvSpPr>
+        <p:spPr/>
+        <p:txBody>
+          <a:bodyPr/>
+          <a:lstStyle/>
+          <a:p>
+            <a:pPr marL="0" indent="0">
+              <a:buNone/>
+            </a:pPr>
+            <a:r>
+              <a:rPr lang="en-US" b="0" i="0" dirty="0">
+                <a:solidFill>
+                  <a:srgbClr val="374151"/>
+                </a:solidFill>
+                <a:effectLst/>
+                <a:latin typeface="Söhne"/>
+              </a:rPr>
+              <a:t>Deriving the three-dimensional shape of objects using infrared imaging techniques and the properties of infrared light.</a:t>
+            </a:r>
+            <a:endParaRPr lang="en-US" dirty="0"/>
+          </a:p>
+        </p:txBody>
+      </p:sp>
+    </p:spTree>
+    <p:extLst>
+      <p:ext uri="{BB962C8B-B14F-4D97-AF65-F5344CB8AC3E}">
+        <p14:creationId xmlns:p14="http://schemas.microsoft.com/office/powerpoint/2010/main" val="580192339"/>
+      </p:ext>
+    </p:extLst>
+  </p:cSld>
+  <p:clrMapOvr>
+    <a:masterClrMapping/>
+  </p:clrMapOvr>
+</p:sld>
+</file>
+
+<file path=ppt/slides/slide13.xml><?xml version="1.0" encoding="utf-8"?>
+<p:sld xmlns:a="http://schemas.openxmlformats.org/drawingml/2006/main" xmlns:r="http://schemas.openxmlformats.org/officeDocument/2006/relationships" xmlns:p="http://schemas.openxmlformats.org/presentationml/2006/main">
+  <p:cSld>
+    <p:spTree>
+      <p:nvGrpSpPr>
+        <p:cNvPr id="1" name=""/>
+        <p:cNvGrpSpPr/>
+        <p:nvPr/>
+      </p:nvGrpSpPr>
+      <p:grpSpPr>
+        <a:xfrm>
+          <a:off x="0" y="0"/>
+          <a:ext cx="0" cy="0"/>
+          <a:chOff x="0" y="0"/>
+          <a:chExt cx="0" cy="0"/>
+        </a:xfrm>
+      </p:grpSpPr>
+      <p:sp>
+        <p:nvSpPr>
+          <p:cNvPr id="2" name="Title 1">
+            <a:extLst>
+              <a:ext uri="{FF2B5EF4-FFF2-40B4-BE49-F238E27FC236}">
+                <a16:creationId xmlns:a16="http://schemas.microsoft.com/office/drawing/2014/main" id="{C8148C2D-D0B2-2B3A-145A-951954DBFF97}"/>
+              </a:ext>
+            </a:extLst>
+          </p:cNvPr>
+          <p:cNvSpPr>
+            <a:spLocks noGrp="1"/>
+          </p:cNvSpPr>
+          <p:nvPr>
+            <p:ph type="title"/>
+          </p:nvPr>
+        </p:nvSpPr>
+        <p:spPr/>
+        <p:txBody>
+          <a:bodyPr/>
+          <a:lstStyle/>
+          <a:p>
+            <a:r>
+              <a:rPr lang="en-US" b="1" i="0" dirty="0">
+                <a:effectLst/>
+                <a:latin typeface="Söhne"/>
+              </a:rPr>
+              <a:t>Shape from Sound (</a:t>
+            </a:r>
+            <a:r>
+              <a:rPr lang="en-US" b="1" i="0" dirty="0" err="1">
+                <a:effectLst/>
+                <a:latin typeface="Söhne"/>
+              </a:rPr>
+              <a:t>SfSd</a:t>
+            </a:r>
+            <a:r>
+              <a:rPr lang="en-US" b="1" i="0" dirty="0">
+                <a:effectLst/>
+                <a:latin typeface="Söhne"/>
+              </a:rPr>
+              <a:t>)</a:t>
+            </a:r>
+            <a:endParaRPr lang="en-US" dirty="0"/>
+          </a:p>
+        </p:txBody>
+      </p:sp>
+      <p:sp>
+        <p:nvSpPr>
+          <p:cNvPr id="3" name="Content Placeholder 2">
+            <a:extLst>
+              <a:ext uri="{FF2B5EF4-FFF2-40B4-BE49-F238E27FC236}">
+                <a16:creationId xmlns:a16="http://schemas.microsoft.com/office/drawing/2014/main" id="{5C2BA4CF-B789-FDE0-329E-5EB7DCF14D91}"/>
+              </a:ext>
+            </a:extLst>
+          </p:cNvPr>
+          <p:cNvSpPr>
+            <a:spLocks noGrp="1"/>
+          </p:cNvSpPr>
+          <p:nvPr>
+            <p:ph idx="1"/>
+          </p:nvPr>
+        </p:nvSpPr>
+        <p:spPr/>
+        <p:txBody>
+          <a:bodyPr/>
+          <a:lstStyle/>
+          <a:p>
+            <a:pPr marL="0" indent="0">
+              <a:buNone/>
+            </a:pPr>
+            <a:r>
+              <a:rPr lang="en-US" b="0" i="0" dirty="0">
+                <a:solidFill>
+                  <a:srgbClr val="374151"/>
+                </a:solidFill>
+                <a:effectLst/>
+                <a:latin typeface="Söhne"/>
+              </a:rPr>
+              <a:t>Estimating 3D shapes through the analysis of sound waves or echoes, often used in applications like sonar and echolocation.</a:t>
+            </a:r>
+          </a:p>
+          <a:p>
+            <a:pPr marL="0" indent="0">
+              <a:buNone/>
+            </a:pPr>
+            <a:endParaRPr lang="en-US" dirty="0"/>
+          </a:p>
+        </p:txBody>
+      </p:sp>
+    </p:spTree>
+    <p:extLst>
+      <p:ext uri="{BB962C8B-B14F-4D97-AF65-F5344CB8AC3E}">
+        <p14:creationId xmlns:p14="http://schemas.microsoft.com/office/powerpoint/2010/main" val="222616373"/>
+      </p:ext>
+    </p:extLst>
+  </p:cSld>
+  <p:clrMapOvr>
+    <a:masterClrMapping/>
+  </p:clrMapOvr>
+</p:sld>
+</file>
+
+<file path=ppt/slides/slide14.xml><?xml version="1.0" encoding="utf-8"?>
+<p:sld xmlns:a="http://schemas.openxmlformats.org/drawingml/2006/main" xmlns:r="http://schemas.openxmlformats.org/officeDocument/2006/relationships" xmlns:p="http://schemas.openxmlformats.org/presentationml/2006/main">
+  <p:cSld>
+    <p:spTree>
+      <p:nvGrpSpPr>
+        <p:cNvPr id="1" name=""/>
+        <p:cNvGrpSpPr/>
+        <p:nvPr/>
+      </p:nvGrpSpPr>
+      <p:grpSpPr>
+        <a:xfrm>
+          <a:off x="0" y="0"/>
+          <a:ext cx="0" cy="0"/>
+          <a:chOff x="0" y="0"/>
+          <a:chExt cx="0" cy="0"/>
+        </a:xfrm>
+      </p:grpSpPr>
+      <p:sp>
+        <p:nvSpPr>
+          <p:cNvPr id="2" name="Title 1">
+            <a:extLst>
+              <a:ext uri="{FF2B5EF4-FFF2-40B4-BE49-F238E27FC236}">
+                <a16:creationId xmlns:a16="http://schemas.microsoft.com/office/drawing/2014/main" id="{EC9B0B66-3229-B39C-46FD-75F660D6C434}"/>
+              </a:ext>
+            </a:extLst>
+          </p:cNvPr>
+          <p:cNvSpPr>
+            <a:spLocks noGrp="1"/>
+          </p:cNvSpPr>
+          <p:nvPr>
+            <p:ph type="title"/>
+          </p:nvPr>
+        </p:nvSpPr>
+        <p:spPr/>
+        <p:txBody>
+          <a:bodyPr/>
+          <a:lstStyle/>
+          <a:p>
+            <a:r>
+              <a:rPr lang="en-US" b="1" i="0" dirty="0">
+                <a:effectLst/>
+                <a:latin typeface="Söhne"/>
+              </a:rPr>
+              <a:t>Shape from X-ray or CT Scan</a:t>
+            </a:r>
+            <a:endParaRPr lang="en-US" dirty="0"/>
+          </a:p>
+        </p:txBody>
+      </p:sp>
+      <p:sp>
+        <p:nvSpPr>
+          <p:cNvPr id="3" name="Content Placeholder 2">
+            <a:extLst>
+              <a:ext uri="{FF2B5EF4-FFF2-40B4-BE49-F238E27FC236}">
+                <a16:creationId xmlns:a16="http://schemas.microsoft.com/office/drawing/2014/main" id="{4F378B87-01D6-37FE-41BB-77ACA7B1B1AF}"/>
+              </a:ext>
+            </a:extLst>
+          </p:cNvPr>
+          <p:cNvSpPr>
+            <a:spLocks noGrp="1"/>
+          </p:cNvSpPr>
+          <p:nvPr>
+            <p:ph idx="1"/>
+          </p:nvPr>
+        </p:nvSpPr>
+        <p:spPr/>
+        <p:txBody>
+          <a:bodyPr/>
+          <a:lstStyle/>
+          <a:p>
+            <a:pPr marL="0" indent="0">
+              <a:buNone/>
+            </a:pPr>
+            <a:r>
+              <a:rPr lang="en-US" b="0" i="0" dirty="0">
+                <a:solidFill>
+                  <a:srgbClr val="374151"/>
+                </a:solidFill>
+                <a:effectLst/>
+                <a:latin typeface="Söhne"/>
+              </a:rPr>
+              <a:t>Reconstructing the internal and external 3D structure of objects or organisms by using X-rays or computed tomography (CT) scans to analyze the attenuation of X-ray beams through the object.</a:t>
+            </a:r>
+            <a:endParaRPr lang="en-US" dirty="0"/>
+          </a:p>
+        </p:txBody>
+      </p:sp>
+    </p:spTree>
+    <p:extLst>
+      <p:ext uri="{BB962C8B-B14F-4D97-AF65-F5344CB8AC3E}">
+        <p14:creationId xmlns:p14="http://schemas.microsoft.com/office/powerpoint/2010/main" val="4196469406"/>
+      </p:ext>
+    </p:extLst>
+  </p:cSld>
+  <p:clrMapOvr>
+    <a:masterClrMapping/>
+  </p:clrMapOvr>
+</p:sld>
+</file>
+
+<file path=ppt/slides/slide15.xml><?xml version="1.0" encoding="utf-8"?>
+<p:sld xmlns:a="http://schemas.openxmlformats.org/drawingml/2006/main" xmlns:r="http://schemas.openxmlformats.org/officeDocument/2006/relationships" xmlns:p="http://schemas.openxmlformats.org/presentationml/2006/main">
+  <p:cSld>
+    <p:spTree>
+      <p:nvGrpSpPr>
+        <p:cNvPr id="1" name=""/>
+        <p:cNvGrpSpPr/>
+        <p:nvPr/>
+      </p:nvGrpSpPr>
+      <p:grpSpPr>
+        <a:xfrm>
+          <a:off x="0" y="0"/>
+          <a:ext cx="0" cy="0"/>
+          <a:chOff x="0" y="0"/>
+          <a:chExt cx="0" cy="0"/>
+        </a:xfrm>
+      </p:grpSpPr>
+      <p:sp>
+        <p:nvSpPr>
+          <p:cNvPr id="2" name="Title 1">
+            <a:extLst>
+              <a:ext uri="{FF2B5EF4-FFF2-40B4-BE49-F238E27FC236}">
+                <a16:creationId xmlns:a16="http://schemas.microsoft.com/office/drawing/2014/main" id="{B62978DC-78C6-185D-6F82-70576E393402}"/>
+              </a:ext>
+            </a:extLst>
+          </p:cNvPr>
+          <p:cNvSpPr>
+            <a:spLocks noGrp="1"/>
+          </p:cNvSpPr>
+          <p:nvPr>
+            <p:ph type="title"/>
+          </p:nvPr>
+        </p:nvSpPr>
+        <p:spPr/>
+        <p:txBody>
+          <a:bodyPr/>
+          <a:lstStyle/>
+          <a:p>
+            <a:r>
+              <a:rPr lang="en-US" b="1" i="0" dirty="0">
+                <a:effectLst/>
+                <a:latin typeface="Söhne"/>
+              </a:rPr>
+              <a:t>Photometric Stereo</a:t>
+            </a:r>
+            <a:endParaRPr lang="en-US" dirty="0"/>
+          </a:p>
+        </p:txBody>
+      </p:sp>
+      <p:sp>
+        <p:nvSpPr>
+          <p:cNvPr id="3" name="Content Placeholder 2">
+            <a:extLst>
+              <a:ext uri="{FF2B5EF4-FFF2-40B4-BE49-F238E27FC236}">
+                <a16:creationId xmlns:a16="http://schemas.microsoft.com/office/drawing/2014/main" id="{01818510-F8C6-C0A1-F578-AE45049DD7D9}"/>
+              </a:ext>
+            </a:extLst>
+          </p:cNvPr>
+          <p:cNvSpPr>
+            <a:spLocks noGrp="1"/>
+          </p:cNvSpPr>
+          <p:nvPr>
+            <p:ph idx="1"/>
+          </p:nvPr>
+        </p:nvSpPr>
+        <p:spPr/>
+        <p:txBody>
+          <a:bodyPr/>
+          <a:lstStyle/>
+          <a:p>
+            <a:pPr marL="0" indent="0">
+              <a:buNone/>
+            </a:pPr>
+            <a:r>
+              <a:rPr lang="en-US" b="0" i="0" dirty="0">
+                <a:solidFill>
+                  <a:srgbClr val="374151"/>
+                </a:solidFill>
+                <a:effectLst/>
+                <a:latin typeface="Söhne"/>
+              </a:rPr>
+              <a:t>A technique that calculates the surface </a:t>
+            </a:r>
+            <a:r>
+              <a:rPr lang="en-US" b="0" i="0" dirty="0" err="1">
+                <a:solidFill>
+                  <a:srgbClr val="374151"/>
+                </a:solidFill>
+                <a:effectLst/>
+                <a:latin typeface="Söhne"/>
+              </a:rPr>
+              <a:t>normals</a:t>
+            </a:r>
+            <a:r>
+              <a:rPr lang="en-US" b="0" i="0" dirty="0">
+                <a:solidFill>
+                  <a:srgbClr val="374151"/>
+                </a:solidFill>
+                <a:effectLst/>
+                <a:latin typeface="Söhne"/>
+              </a:rPr>
+              <a:t> and 3D shape of an object by capturing multiple images of the same object under different lighting conditions and analyzing how the object's appearance changes with varying lighting angles.</a:t>
+            </a:r>
+            <a:endParaRPr lang="en-US" dirty="0"/>
+          </a:p>
+        </p:txBody>
+      </p:sp>
+    </p:spTree>
+    <p:extLst>
+      <p:ext uri="{BB962C8B-B14F-4D97-AF65-F5344CB8AC3E}">
+        <p14:creationId xmlns:p14="http://schemas.microsoft.com/office/powerpoint/2010/main" val="2332198071"/>
+      </p:ext>
+    </p:extLst>
+  </p:cSld>
+  <p:clrMapOvr>
+    <a:masterClrMapping/>
+  </p:clrMapOvr>
+</p:sld>
+</file>
+
+<file path=ppt/slides/slide16.xml><?xml version="1.0" encoding="utf-8"?>
+<p:sld xmlns:a="http://schemas.openxmlformats.org/drawingml/2006/main" xmlns:r="http://schemas.openxmlformats.org/officeDocument/2006/relationships" xmlns:p="http://schemas.openxmlformats.org/presentationml/2006/main">
+  <p:cSld>
+    <p:spTree>
+      <p:nvGrpSpPr>
+        <p:cNvPr id="1" name=""/>
+        <p:cNvGrpSpPr/>
+        <p:nvPr/>
+      </p:nvGrpSpPr>
+      <p:grpSpPr>
+        <a:xfrm>
+          <a:off x="0" y="0"/>
+          <a:ext cx="0" cy="0"/>
+          <a:chOff x="0" y="0"/>
+          <a:chExt cx="0" cy="0"/>
+        </a:xfrm>
+      </p:grpSpPr>
+      <p:sp>
+        <p:nvSpPr>
+          <p:cNvPr id="2" name="Title 1">
+            <a:extLst>
+              <a:ext uri="{FF2B5EF4-FFF2-40B4-BE49-F238E27FC236}">
+                <a16:creationId xmlns:a16="http://schemas.microsoft.com/office/drawing/2014/main" id="{DB192CDE-0CBF-4188-6051-9E4193045B52}"/>
+              </a:ext>
+            </a:extLst>
+          </p:cNvPr>
+          <p:cNvSpPr>
+            <a:spLocks noGrp="1"/>
+          </p:cNvSpPr>
+          <p:nvPr>
+            <p:ph type="title"/>
+          </p:nvPr>
+        </p:nvSpPr>
+        <p:spPr/>
+        <p:txBody>
+          <a:bodyPr/>
+          <a:lstStyle/>
+          <a:p>
+            <a:r>
+              <a:rPr lang="en-US" b="1" i="0" dirty="0">
+                <a:effectLst/>
+                <a:latin typeface="Söhne"/>
+              </a:rPr>
+              <a:t>Comparison of </a:t>
+            </a:r>
+            <a:r>
+              <a:rPr lang="en-US" b="1" i="0" dirty="0" err="1">
+                <a:effectLst/>
+                <a:latin typeface="Söhne"/>
+              </a:rPr>
+              <a:t>SfS</a:t>
+            </a:r>
+            <a:r>
+              <a:rPr lang="en-US" b="1" i="0" dirty="0">
+                <a:effectLst/>
+                <a:latin typeface="Söhne"/>
+              </a:rPr>
+              <a:t> and PS</a:t>
+            </a:r>
+            <a:endParaRPr lang="en-US" dirty="0"/>
+          </a:p>
+        </p:txBody>
+      </p:sp>
+      <p:sp>
+        <p:nvSpPr>
+          <p:cNvPr id="3" name="Content Placeholder 2">
+            <a:extLst>
+              <a:ext uri="{FF2B5EF4-FFF2-40B4-BE49-F238E27FC236}">
+                <a16:creationId xmlns:a16="http://schemas.microsoft.com/office/drawing/2014/main" id="{EF639E16-BC7B-922F-3E55-7ACC7ADEA471}"/>
+              </a:ext>
+            </a:extLst>
+          </p:cNvPr>
+          <p:cNvSpPr>
+            <a:spLocks noGrp="1"/>
+          </p:cNvSpPr>
+          <p:nvPr>
+            <p:ph idx="1"/>
+          </p:nvPr>
+        </p:nvSpPr>
+        <p:spPr/>
+        <p:txBody>
+          <a:bodyPr/>
+          <a:lstStyle/>
+          <a:p>
+            <a:pPr marL="0" indent="0">
+              <a:buNone/>
+            </a:pPr>
+            <a:r>
+              <a:rPr lang="en-US" b="0" i="0" dirty="0">
+                <a:solidFill>
+                  <a:srgbClr val="374151"/>
+                </a:solidFill>
+                <a:effectLst/>
+                <a:latin typeface="Söhne"/>
+              </a:rPr>
+              <a:t>A comparison between "Shape from Shading" (</a:t>
+            </a:r>
+            <a:r>
+              <a:rPr lang="en-US" b="0" i="0" dirty="0" err="1">
+                <a:solidFill>
+                  <a:srgbClr val="374151"/>
+                </a:solidFill>
+                <a:effectLst/>
+                <a:latin typeface="Söhne"/>
+              </a:rPr>
+              <a:t>SfS</a:t>
+            </a:r>
+            <a:r>
+              <a:rPr lang="en-US" b="0" i="0" dirty="0">
+                <a:solidFill>
+                  <a:srgbClr val="374151"/>
+                </a:solidFill>
+                <a:effectLst/>
+                <a:latin typeface="Söhne"/>
+              </a:rPr>
+              <a:t>) and "Photometric Stereo" (PS) techniques, which both aim to recover 3D shape from images, highlighting their differences, advantages, and limitations.</a:t>
+            </a:r>
+            <a:endParaRPr lang="en-US" dirty="0"/>
+          </a:p>
+        </p:txBody>
+      </p:sp>
+    </p:spTree>
+    <p:extLst>
+      <p:ext uri="{BB962C8B-B14F-4D97-AF65-F5344CB8AC3E}">
+        <p14:creationId xmlns:p14="http://schemas.microsoft.com/office/powerpoint/2010/main" val="3426252920"/>
+      </p:ext>
+    </p:extLst>
+  </p:cSld>
+  <p:clrMapOvr>
+    <a:masterClrMapping/>
+  </p:clrMapOvr>
+</p:sld>
+</file>
+
+<file path=ppt/slides/slide17.xml><?xml version="1.0" encoding="utf-8"?>
+<p:sld xmlns:a="http://schemas.openxmlformats.org/drawingml/2006/main" xmlns:r="http://schemas.openxmlformats.org/officeDocument/2006/relationships" xmlns:p="http://schemas.openxmlformats.org/presentationml/2006/main">
+  <p:cSld>
+    <p:spTree>
+      <p:nvGrpSpPr>
+        <p:cNvPr id="1" name=""/>
+        <p:cNvGrpSpPr/>
+        <p:nvPr/>
+      </p:nvGrpSpPr>
+      <p:grpSpPr>
+        <a:xfrm>
+          <a:off x="0" y="0"/>
+          <a:ext cx="0" cy="0"/>
+          <a:chOff x="0" y="0"/>
+          <a:chExt cx="0" cy="0"/>
+        </a:xfrm>
+      </p:grpSpPr>
+      <p:sp>
+        <p:nvSpPr>
+          <p:cNvPr id="2" name="Title 1">
+            <a:extLst>
+              <a:ext uri="{FF2B5EF4-FFF2-40B4-BE49-F238E27FC236}">
+                <a16:creationId xmlns:a16="http://schemas.microsoft.com/office/drawing/2014/main" id="{5C1A9DF1-BBF1-39E3-673A-5862AAE656BE}"/>
+              </a:ext>
+            </a:extLst>
+          </p:cNvPr>
+          <p:cNvSpPr>
+            <a:spLocks noGrp="1"/>
+          </p:cNvSpPr>
+          <p:nvPr>
+            <p:ph type="title"/>
+          </p:nvPr>
+        </p:nvSpPr>
+        <p:spPr/>
+        <p:txBody>
+          <a:bodyPr/>
+          <a:lstStyle/>
+          <a:p>
+            <a:r>
+              <a:rPr lang="en-US" b="1" i="0" dirty="0">
+                <a:effectLst/>
+                <a:latin typeface="Söhne"/>
+              </a:rPr>
+              <a:t>Applications of Shape from X</a:t>
+            </a:r>
+            <a:endParaRPr lang="en-US" dirty="0"/>
+          </a:p>
+        </p:txBody>
+      </p:sp>
+      <p:sp>
+        <p:nvSpPr>
+          <p:cNvPr id="3" name="Content Placeholder 2">
+            <a:extLst>
+              <a:ext uri="{FF2B5EF4-FFF2-40B4-BE49-F238E27FC236}">
+                <a16:creationId xmlns:a16="http://schemas.microsoft.com/office/drawing/2014/main" id="{9F84C3D0-C778-374E-5CB4-B4E0C1826971}"/>
+              </a:ext>
+            </a:extLst>
+          </p:cNvPr>
+          <p:cNvSpPr>
+            <a:spLocks noGrp="1"/>
+          </p:cNvSpPr>
+          <p:nvPr>
+            <p:ph idx="1"/>
+          </p:nvPr>
+        </p:nvSpPr>
+        <p:spPr/>
+        <p:txBody>
+          <a:bodyPr/>
+          <a:lstStyle/>
+          <a:p>
+            <a:pPr marL="0" indent="0">
+              <a:buNone/>
+            </a:pPr>
+            <a:r>
+              <a:rPr lang="en-US" b="0" i="0" dirty="0">
+                <a:solidFill>
+                  <a:srgbClr val="374151"/>
+                </a:solidFill>
+                <a:effectLst/>
+                <a:latin typeface="Söhne"/>
+              </a:rPr>
+              <a:t>Refers to the various practical uses of techniques for deriving 3D shape information, where 'X' can represent any of the methods mentioned in your previous question (e.g., Shape from Shading, Shape from Motion, etc.).</a:t>
+            </a:r>
+            <a:endParaRPr lang="en-US" dirty="0"/>
+          </a:p>
+        </p:txBody>
+      </p:sp>
+    </p:spTree>
+    <p:extLst>
+      <p:ext uri="{BB962C8B-B14F-4D97-AF65-F5344CB8AC3E}">
+        <p14:creationId xmlns:p14="http://schemas.microsoft.com/office/powerpoint/2010/main" val="1162436635"/>
+      </p:ext>
+    </p:extLst>
+  </p:cSld>
+  <p:clrMapOvr>
+    <a:masterClrMapping/>
+  </p:clrMapOvr>
+</p:sld>
+</file>
+
+<file path=ppt/slides/slide18.xml><?xml version="1.0" encoding="utf-8"?>
+<p:sld xmlns:a="http://schemas.openxmlformats.org/drawingml/2006/main" xmlns:r="http://schemas.openxmlformats.org/officeDocument/2006/relationships" xmlns:p="http://schemas.openxmlformats.org/presentationml/2006/main">
+  <p:cSld>
+    <p:spTree>
+      <p:nvGrpSpPr>
+        <p:cNvPr id="1" name=""/>
+        <p:cNvGrpSpPr/>
+        <p:nvPr/>
+      </p:nvGrpSpPr>
+      <p:grpSpPr>
+        <a:xfrm>
+          <a:off x="0" y="0"/>
+          <a:ext cx="0" cy="0"/>
+          <a:chOff x="0" y="0"/>
+          <a:chExt cx="0" cy="0"/>
+        </a:xfrm>
+      </p:grpSpPr>
+      <p:sp>
+        <p:nvSpPr>
+          <p:cNvPr id="2" name="Title 1">
+            <a:extLst>
+              <a:ext uri="{FF2B5EF4-FFF2-40B4-BE49-F238E27FC236}">
+                <a16:creationId xmlns:a16="http://schemas.microsoft.com/office/drawing/2014/main" id="{9EEFFF68-9AD7-77DD-A770-50D04FE2975B}"/>
+              </a:ext>
+            </a:extLst>
+          </p:cNvPr>
+          <p:cNvSpPr>
+            <a:spLocks noGrp="1"/>
+          </p:cNvSpPr>
+          <p:nvPr>
+            <p:ph type="title"/>
+          </p:nvPr>
+        </p:nvSpPr>
+        <p:spPr/>
+        <p:txBody>
+          <a:bodyPr/>
+          <a:lstStyle/>
+          <a:p>
+            <a:r>
+              <a:rPr lang="en-US" b="1" i="0" dirty="0">
+                <a:effectLst/>
+                <a:latin typeface="Söhne"/>
+              </a:rPr>
+              <a:t>Challenges and Future Directions</a:t>
+            </a:r>
+            <a:endParaRPr lang="en-US" dirty="0"/>
+          </a:p>
+        </p:txBody>
+      </p:sp>
+      <p:sp>
+        <p:nvSpPr>
+          <p:cNvPr id="3" name="Content Placeholder 2">
+            <a:extLst>
+              <a:ext uri="{FF2B5EF4-FFF2-40B4-BE49-F238E27FC236}">
+                <a16:creationId xmlns:a16="http://schemas.microsoft.com/office/drawing/2014/main" id="{EFCB1FE6-2C39-52FC-94A9-8B91A2DDC6D2}"/>
+              </a:ext>
+            </a:extLst>
+          </p:cNvPr>
+          <p:cNvSpPr>
+            <a:spLocks noGrp="1"/>
+          </p:cNvSpPr>
+          <p:nvPr>
+            <p:ph idx="1"/>
+          </p:nvPr>
+        </p:nvSpPr>
+        <p:spPr/>
+        <p:txBody>
+          <a:bodyPr/>
+          <a:lstStyle/>
+          <a:p>
+            <a:pPr marL="0" indent="0">
+              <a:buNone/>
+            </a:pPr>
+            <a:r>
+              <a:rPr lang="en-US" b="0" i="0" dirty="0">
+                <a:solidFill>
+                  <a:srgbClr val="374151"/>
+                </a:solidFill>
+                <a:effectLst/>
+                <a:latin typeface="Söhne"/>
+              </a:rPr>
+              <a:t>Discussing the difficulties and potential advancements in the field of deriving 3D shape from 2D data, exploring areas for improvement and future research directions.</a:t>
+            </a:r>
+            <a:endParaRPr lang="en-US" dirty="0"/>
+          </a:p>
+        </p:txBody>
+      </p:sp>
+    </p:spTree>
+    <p:extLst>
+      <p:ext uri="{BB962C8B-B14F-4D97-AF65-F5344CB8AC3E}">
+        <p14:creationId xmlns:p14="http://schemas.microsoft.com/office/powerpoint/2010/main" val="4012082842"/>
+      </p:ext>
+    </p:extLst>
+  </p:cSld>
+  <p:clrMapOvr>
+    <a:masterClrMapping/>
+  </p:clrMapOvr>
+</p:sld>
+</file>
+
+<file path=ppt/slides/slide19.xml><?xml version="1.0" encoding="utf-8"?>
+<p:sld xmlns:a="http://schemas.openxmlformats.org/drawingml/2006/main" xmlns:r="http://schemas.openxmlformats.org/officeDocument/2006/relationships" xmlns:p="http://schemas.openxmlformats.org/presentationml/2006/main">
+  <p:cSld>
+    <p:spTree>
+      <p:nvGrpSpPr>
+        <p:cNvPr id="1" name=""/>
+        <p:cNvGrpSpPr/>
+        <p:nvPr/>
+      </p:nvGrpSpPr>
+      <p:grpSpPr>
+        <a:xfrm>
+          <a:off x="0" y="0"/>
+          <a:ext cx="0" cy="0"/>
+          <a:chOff x="0" y="0"/>
+          <a:chExt cx="0" cy="0"/>
+        </a:xfrm>
+      </p:grpSpPr>
+      <p:sp>
+        <p:nvSpPr>
+          <p:cNvPr id="2" name="Title 1">
+            <a:extLst>
+              <a:ext uri="{FF2B5EF4-FFF2-40B4-BE49-F238E27FC236}">
+                <a16:creationId xmlns:a16="http://schemas.microsoft.com/office/drawing/2014/main" id="{5A9CB111-2D28-5F89-D510-7DD6399BD471}"/>
+              </a:ext>
+            </a:extLst>
+          </p:cNvPr>
+          <p:cNvSpPr>
+            <a:spLocks noGrp="1"/>
+          </p:cNvSpPr>
+          <p:nvPr>
+            <p:ph type="title"/>
+          </p:nvPr>
+        </p:nvSpPr>
+        <p:spPr/>
+        <p:txBody>
+          <a:bodyPr/>
+          <a:lstStyle/>
+          <a:p>
+            <a:endParaRPr lang="en-US"/>
+          </a:p>
+        </p:txBody>
+      </p:sp>
+      <p:sp>
+        <p:nvSpPr>
+          <p:cNvPr id="3" name="Content Placeholder 2">
+            <a:extLst>
+              <a:ext uri="{FF2B5EF4-FFF2-40B4-BE49-F238E27FC236}">
+                <a16:creationId xmlns:a16="http://schemas.microsoft.com/office/drawing/2014/main" id="{01B756D9-32DF-7B6D-A26D-C74B38452B4D}"/>
+              </a:ext>
+            </a:extLst>
+          </p:cNvPr>
+          <p:cNvSpPr>
+            <a:spLocks noGrp="1"/>
+          </p:cNvSpPr>
+          <p:nvPr>
+            <p:ph idx="1"/>
+          </p:nvPr>
+        </p:nvSpPr>
+        <p:spPr/>
+        <p:txBody>
+          <a:bodyPr/>
+          <a:lstStyle/>
+          <a:p>
+            <a:endParaRPr lang="en-US"/>
+          </a:p>
+        </p:txBody>
+      </p:sp>
+    </p:spTree>
+    <p:extLst>
+      <p:ext uri="{BB962C8B-B14F-4D97-AF65-F5344CB8AC3E}">
+        <p14:creationId xmlns:p14="http://schemas.microsoft.com/office/powerpoint/2010/main" val="1992581109"/>
       </p:ext>
     </p:extLst>
   </p:cSld>
@@ -3783,7 +4866,7 @@
         <p:spPr/>
         <p:txBody>
           <a:bodyPr>
-            <a:normAutofit fontScale="85000" lnSpcReduction="20000"/>
+            <a:noAutofit/>
           </a:bodyPr>
           <a:lstStyle/>
           <a:p>
@@ -3953,10 +5036,15 @@
             <p:ph sz="half" idx="2"/>
           </p:nvPr>
         </p:nvSpPr>
-        <p:spPr/>
+        <p:spPr>
+          <a:xfrm>
+            <a:off x="6413771" y="2017343"/>
+            <a:ext cx="4645152" cy="4035768"/>
+          </a:xfrm>
+        </p:spPr>
         <p:txBody>
           <a:bodyPr>
-            <a:normAutofit fontScale="85000" lnSpcReduction="20000"/>
+            <a:noAutofit/>
           </a:bodyPr>
           <a:lstStyle/>
           <a:p>
@@ -4178,36 +5266,29 @@
             <p:ph sz="half" idx="1"/>
           </p:nvPr>
         </p:nvSpPr>
-        <p:spPr/>
-        <p:txBody>
-          <a:bodyPr/>
-          <a:lstStyle/>
-          <a:p>
-            <a:endParaRPr lang="en-US" dirty="0"/>
-          </a:p>
-        </p:txBody>
-      </p:sp>
-      <p:sp>
-        <p:nvSpPr>
-          <p:cNvPr id="4" name="Content Placeholder 3">
-            <a:extLst>
-              <a:ext uri="{FF2B5EF4-FFF2-40B4-BE49-F238E27FC236}">
-                <a16:creationId xmlns:a16="http://schemas.microsoft.com/office/drawing/2014/main" id="{5CED8365-ECDC-0DAD-A614-B2C17CD046D5}"/>
-              </a:ext>
-            </a:extLst>
-          </p:cNvPr>
-          <p:cNvSpPr>
-            <a:spLocks noGrp="1"/>
-          </p:cNvSpPr>
-          <p:nvPr>
-            <p:ph sz="half" idx="2"/>
-          </p:nvPr>
-        </p:nvSpPr>
-        <p:spPr/>
-        <p:txBody>
-          <a:bodyPr/>
-          <a:lstStyle/>
-          <a:p>
+        <p:spPr>
+          <a:xfrm>
+            <a:off x="1447330" y="2010878"/>
+            <a:ext cx="9605635" cy="3448595"/>
+          </a:xfrm>
+        </p:spPr>
+        <p:txBody>
+          <a:bodyPr/>
+          <a:lstStyle/>
+          <a:p>
+            <a:pPr marL="0" indent="0">
+              <a:buNone/>
+            </a:pPr>
+            <a:r>
+              <a:rPr lang="en-US" b="0" i="0" dirty="0">
+                <a:solidFill>
+                  <a:srgbClr val="374151"/>
+                </a:solidFill>
+                <a:effectLst/>
+                <a:latin typeface="Söhne"/>
+              </a:rPr>
+              <a:t>Various methods of deriving three-dimensional shape information from two-dimensional images or data.</a:t>
+            </a:r>
             <a:endParaRPr lang="en-US" dirty="0"/>
           </a:p>
         </p:txBody>
@@ -4265,7 +5346,7 @@
           <a:p>
             <a:r>
               <a:rPr lang="en-US" dirty="0"/>
-              <a:t>What?! Why?!</a:t>
+              <a:t>Why this topic?!</a:t>
             </a:r>
           </a:p>
         </p:txBody>
@@ -4288,14 +5369,16 @@
         </p:nvSpPr>
         <p:spPr/>
         <p:txBody>
-          <a:bodyPr/>
+          <a:bodyPr>
+            <a:normAutofit/>
+          </a:bodyPr>
           <a:lstStyle/>
           <a:p>
             <a:pPr marL="0" indent="0">
               <a:buNone/>
             </a:pPr>
             <a:r>
-              <a:rPr lang="en-US" sz="2400" b="1" i="0" dirty="0">
+              <a:rPr lang="en-US" b="1" i="0" dirty="0">
                 <a:solidFill>
                   <a:srgbClr val="212438"/>
                 </a:solidFill>
@@ -4304,7 +5387,7 @@
               </a:rPr>
               <a:t>"Existing techniques for extracting 3D information from 2D images are good, but not good enough,"</a:t>
             </a:r>
-            <a:endParaRPr lang="en-US" sz="2400" b="1" dirty="0"/>
+            <a:endParaRPr lang="en-US" b="1" dirty="0"/>
           </a:p>
           <a:p>
             <a:pPr marL="0" indent="0">
@@ -4359,7 +5442,7 @@
           <p:cNvPr id="2" name="Title 1">
             <a:extLst>
               <a:ext uri="{FF2B5EF4-FFF2-40B4-BE49-F238E27FC236}">
-                <a16:creationId xmlns:a16="http://schemas.microsoft.com/office/drawing/2014/main" id="{DF1D24E5-4428-21E5-F733-1530C5D96EB9}"/>
+                <a16:creationId xmlns:a16="http://schemas.microsoft.com/office/drawing/2014/main" id="{EA5FB76B-FCC2-3C20-C469-F1D0E7AABE2F}"/>
               </a:ext>
             </a:extLst>
           </p:cNvPr>
@@ -4375,6 +5458,41 @@
           <a:bodyPr/>
           <a:lstStyle/>
           <a:p>
+            <a:r>
+              <a:rPr lang="en-US" b="1" i="0" dirty="0">
+                <a:effectLst/>
+                <a:latin typeface="Söhne"/>
+              </a:rPr>
+              <a:t>Shape from Shading</a:t>
+            </a:r>
+            <a:endParaRPr lang="en-US" dirty="0"/>
+          </a:p>
+        </p:txBody>
+      </p:sp>
+      <p:sp>
+        <p:nvSpPr>
+          <p:cNvPr id="3" name="Content Placeholder 2">
+            <a:extLst>
+              <a:ext uri="{FF2B5EF4-FFF2-40B4-BE49-F238E27FC236}">
+                <a16:creationId xmlns:a16="http://schemas.microsoft.com/office/drawing/2014/main" id="{431A2447-6733-E394-0CF5-30AAD193FDE3}"/>
+              </a:ext>
+            </a:extLst>
+          </p:cNvPr>
+          <p:cNvSpPr>
+            <a:spLocks noGrp="1"/>
+          </p:cNvSpPr>
+          <p:nvPr>
+            <p:ph idx="1"/>
+          </p:nvPr>
+        </p:nvSpPr>
+        <p:spPr/>
+        <p:txBody>
+          <a:bodyPr/>
+          <a:lstStyle/>
+          <a:p>
+            <a:pPr marL="0" indent="0">
+              <a:buNone/>
+            </a:pPr>
             <a:r>
               <a:rPr lang="en-US" b="0" i="0" dirty="0">
                 <a:solidFill>
@@ -4383,163 +5501,21 @@
                 <a:effectLst/>
                 <a:latin typeface="Söhne"/>
               </a:rPr>
-              <a:t>Shape from Motion</a:t>
-            </a:r>
+              <a:t>Determining the 3D shape of an object by analyzing the variations in brightness and shading in an image.</a:t>
+            </a:r>
+          </a:p>
+          <a:p>
+            <a:pPr marL="0" indent="0">
+              <a:buNone/>
+            </a:pPr>
             <a:endParaRPr lang="en-US" dirty="0"/>
-          </a:p>
-        </p:txBody>
-      </p:sp>
-      <p:sp>
-        <p:nvSpPr>
-          <p:cNvPr id="3" name="Content Placeholder 2">
-            <a:extLst>
-              <a:ext uri="{FF2B5EF4-FFF2-40B4-BE49-F238E27FC236}">
-                <a16:creationId xmlns:a16="http://schemas.microsoft.com/office/drawing/2014/main" id="{918B6A63-CA2C-DF87-8C2D-5CAB394F3F73}"/>
-              </a:ext>
-            </a:extLst>
-          </p:cNvPr>
-          <p:cNvSpPr>
-            <a:spLocks noGrp="1"/>
-          </p:cNvSpPr>
-          <p:nvPr>
-            <p:ph idx="1"/>
-          </p:nvPr>
-        </p:nvSpPr>
-        <p:spPr/>
-        <p:txBody>
-          <a:bodyPr/>
-          <a:lstStyle/>
-          <a:p>
-            <a:pPr algn="l"/>
-            <a:r>
-              <a:rPr lang="en-US" b="0" i="0" dirty="0">
-                <a:solidFill>
-                  <a:srgbClr val="1F1F1F"/>
-                </a:solidFill>
-                <a:effectLst/>
-                <a:latin typeface="Google Sans"/>
-              </a:rPr>
-              <a:t>Structure from motion (</a:t>
-            </a:r>
-            <a:r>
-              <a:rPr lang="en-US" b="0" i="0" dirty="0" err="1">
-                <a:solidFill>
-                  <a:srgbClr val="1F1F1F"/>
-                </a:solidFill>
-                <a:effectLst/>
-                <a:latin typeface="Google Sans"/>
-              </a:rPr>
-              <a:t>SfM</a:t>
-            </a:r>
-            <a:r>
-              <a:rPr lang="en-US" b="0" i="0" dirty="0">
-                <a:solidFill>
-                  <a:srgbClr val="1F1F1F"/>
-                </a:solidFill>
-                <a:effectLst/>
-                <a:latin typeface="Google Sans"/>
-              </a:rPr>
-              <a:t>) is </a:t>
-            </a:r>
-            <a:r>
-              <a:rPr lang="en-US" b="0" i="0" dirty="0">
-                <a:solidFill>
-                  <a:srgbClr val="040C28"/>
-                </a:solidFill>
-                <a:effectLst/>
-                <a:latin typeface="Google Sans"/>
-              </a:rPr>
-              <a:t>the process of estimating the 3-D structure of a scene from a set of 2-D images</a:t>
-            </a:r>
-            <a:r>
-              <a:rPr lang="en-US" b="0" i="0" dirty="0">
-                <a:solidFill>
-                  <a:srgbClr val="1F1F1F"/>
-                </a:solidFill>
-                <a:effectLst/>
-                <a:latin typeface="Google Sans"/>
-              </a:rPr>
-              <a:t>. </a:t>
-            </a:r>
-            <a:r>
-              <a:rPr lang="en-US" b="0" i="0" dirty="0" err="1">
-                <a:solidFill>
-                  <a:srgbClr val="1F1F1F"/>
-                </a:solidFill>
-                <a:effectLst/>
-                <a:latin typeface="Google Sans"/>
-              </a:rPr>
-              <a:t>SfM</a:t>
-            </a:r>
-            <a:r>
-              <a:rPr lang="en-US" b="0" i="0" dirty="0">
-                <a:solidFill>
-                  <a:srgbClr val="1F1F1F"/>
-                </a:solidFill>
-                <a:effectLst/>
-                <a:latin typeface="Google Sans"/>
-              </a:rPr>
-              <a:t> is used in many applications, such as 3-D scanning , augmented reality, and visual simultaneous localization and mapping (</a:t>
-            </a:r>
-            <a:r>
-              <a:rPr lang="en-US" b="0" i="0" dirty="0" err="1">
-                <a:solidFill>
-                  <a:srgbClr val="1F1F1F"/>
-                </a:solidFill>
-                <a:effectLst/>
-                <a:latin typeface="Google Sans"/>
-              </a:rPr>
-              <a:t>vSLAM</a:t>
-            </a:r>
-            <a:r>
-              <a:rPr lang="en-US" b="0" i="0" dirty="0">
-                <a:solidFill>
-                  <a:srgbClr val="1F1F1F"/>
-                </a:solidFill>
-                <a:effectLst/>
-                <a:latin typeface="Google Sans"/>
-              </a:rPr>
-              <a:t>). </a:t>
-            </a:r>
-            <a:r>
-              <a:rPr lang="en-US" b="0" i="0" dirty="0" err="1">
-                <a:solidFill>
-                  <a:srgbClr val="1F1F1F"/>
-                </a:solidFill>
-                <a:effectLst/>
-                <a:latin typeface="Google Sans"/>
-              </a:rPr>
-              <a:t>SfM</a:t>
-            </a:r>
-            <a:r>
-              <a:rPr lang="en-US" b="0" i="0" dirty="0">
-                <a:solidFill>
-                  <a:srgbClr val="1F1F1F"/>
-                </a:solidFill>
-                <a:effectLst/>
-                <a:latin typeface="Google Sans"/>
-              </a:rPr>
-              <a:t> can be computed in many different ways.</a:t>
-            </a:r>
-          </a:p>
-          <a:p>
-            <a:pPr marL="0" indent="0" algn="l">
-              <a:buNone/>
-            </a:pPr>
-            <a:endParaRPr lang="en-DE" b="0" i="0" dirty="0">
-              <a:solidFill>
-                <a:srgbClr val="202124"/>
-              </a:solidFill>
-              <a:effectLst/>
-              <a:latin typeface="arial" panose="020B0604020202020204" pitchFamily="34" charset="0"/>
-            </a:endParaRPr>
           </a:p>
         </p:txBody>
       </p:sp>
     </p:spTree>
     <p:extLst>
       <p:ext uri="{BB962C8B-B14F-4D97-AF65-F5344CB8AC3E}">
-        <p14:creationId xmlns:p14="http://schemas.microsoft.com/office/powerpoint/2010/main" val="3396154175"/>
+        <p14:creationId xmlns:p14="http://schemas.microsoft.com/office/powerpoint/2010/main" val="2638628651"/>
       </p:ext>
     </p:extLst>
   </p:cSld>
@@ -4571,7 +5547,7 @@
           <p:cNvPr id="2" name="Title 1">
             <a:extLst>
               <a:ext uri="{FF2B5EF4-FFF2-40B4-BE49-F238E27FC236}">
-                <a16:creationId xmlns:a16="http://schemas.microsoft.com/office/drawing/2014/main" id="{BD426518-DEC1-7A61-2C4F-A7C0B297181A}"/>
+                <a16:creationId xmlns:a16="http://schemas.microsoft.com/office/drawing/2014/main" id="{DF1D24E5-4428-21E5-F733-1530C5D96EB9}"/>
               </a:ext>
             </a:extLst>
           </p:cNvPr>
@@ -4588,9 +5564,16 @@
           <a:lstStyle/>
           <a:p>
             <a:r>
-              <a:rPr lang="en-US" dirty="0"/>
-              <a:t>Shape from  Texture</a:t>
-            </a:r>
+              <a:rPr lang="en-US" b="0" i="0" dirty="0">
+                <a:solidFill>
+                  <a:srgbClr val="374151"/>
+                </a:solidFill>
+                <a:effectLst/>
+                <a:latin typeface="Söhne"/>
+              </a:rPr>
+              <a:t>Shape from Motion</a:t>
+            </a:r>
+            <a:endParaRPr lang="en-US" dirty="0"/>
           </a:p>
         </p:txBody>
       </p:sp>
@@ -4599,7 +5582,7 @@
           <p:cNvPr id="3" name="Content Placeholder 2">
             <a:extLst>
               <a:ext uri="{FF2B5EF4-FFF2-40B4-BE49-F238E27FC236}">
-                <a16:creationId xmlns:a16="http://schemas.microsoft.com/office/drawing/2014/main" id="{908CB2AD-A365-C101-8328-2DEDBFDB856B}"/>
+                <a16:creationId xmlns:a16="http://schemas.microsoft.com/office/drawing/2014/main" id="{918B6A63-CA2C-DF87-8C2D-5CAB394F3F73}"/>
               </a:ext>
             </a:extLst>
           </p:cNvPr>
@@ -4615,36 +5598,18 @@
           <a:bodyPr/>
           <a:lstStyle/>
           <a:p>
-            <a:pPr algn="l"/>
+            <a:pPr marL="0" indent="0" algn="l">
+              <a:buNone/>
+            </a:pPr>
             <a:r>
               <a:rPr lang="en-US" b="0" i="0" dirty="0">
                 <a:solidFill>
-                  <a:srgbClr val="1F1F1F"/>
+                  <a:srgbClr val="374151"/>
                 </a:solidFill>
                 <a:effectLst/>
-                <a:latin typeface="Google Sans"/>
-              </a:rPr>
-              <a:t>Shape from texture is </a:t>
-            </a:r>
-            <a:r>
-              <a:rPr lang="en-US" b="0" i="0" dirty="0">
-                <a:solidFill>
-                  <a:srgbClr val="040C28"/>
-                </a:solidFill>
-                <a:effectLst/>
-                <a:latin typeface="Google Sans"/>
-              </a:rPr>
-              <a:t>a computer vision technique where a 3D object is reconstructed from a 2D image</a:t>
-            </a:r>
-            <a:r>
-              <a:rPr lang="en-US" b="0" i="0" dirty="0">
-                <a:solidFill>
-                  <a:srgbClr val="1F1F1F"/>
-                </a:solidFill>
-                <a:effectLst/>
-                <a:latin typeface="Google Sans"/>
-              </a:rPr>
-              <a:t>. Although human perception is capable to realize patterns, estimate depth and recognize objects in an image by using texture as a cue, the creation of a system able to mimic that behavior is far from trivial.</a:t>
+                <a:latin typeface="Söhne"/>
+              </a:rPr>
+              <a:t>Inferring the three-dimensional shape of objects by tracking their movement or motion over time.</a:t>
             </a:r>
             <a:endParaRPr lang="en-DE" b="0" i="0" dirty="0">
               <a:solidFill>
@@ -4659,7 +5624,7 @@
     </p:spTree>
     <p:extLst>
       <p:ext uri="{BB962C8B-B14F-4D97-AF65-F5344CB8AC3E}">
-        <p14:creationId xmlns:p14="http://schemas.microsoft.com/office/powerpoint/2010/main" val="2651181899"/>
+        <p14:creationId xmlns:p14="http://schemas.microsoft.com/office/powerpoint/2010/main" val="3396154175"/>
       </p:ext>
     </p:extLst>
   </p:cSld>
@@ -4691,7 +5656,7 @@
           <p:cNvPr id="2" name="Title 1">
             <a:extLst>
               <a:ext uri="{FF2B5EF4-FFF2-40B4-BE49-F238E27FC236}">
-                <a16:creationId xmlns:a16="http://schemas.microsoft.com/office/drawing/2014/main" id="{EA5FB76B-FCC2-3C20-C469-F1D0E7AABE2F}"/>
+                <a16:creationId xmlns:a16="http://schemas.microsoft.com/office/drawing/2014/main" id="{BD426518-DEC1-7A61-2C4F-A7C0B297181A}"/>
               </a:ext>
             </a:extLst>
           </p:cNvPr>
@@ -4707,7 +5672,10 @@
           <a:bodyPr/>
           <a:lstStyle/>
           <a:p>
-            <a:endParaRPr lang="en-US"/>
+            <a:r>
+              <a:rPr lang="en-US" dirty="0"/>
+              <a:t>Shape from  Texture</a:t>
+            </a:r>
           </a:p>
         </p:txBody>
       </p:sp>
@@ -4716,7 +5684,7 @@
           <p:cNvPr id="3" name="Content Placeholder 2">
             <a:extLst>
               <a:ext uri="{FF2B5EF4-FFF2-40B4-BE49-F238E27FC236}">
-                <a16:creationId xmlns:a16="http://schemas.microsoft.com/office/drawing/2014/main" id="{431A2447-6733-E394-0CF5-30AAD193FDE3}"/>
+                <a16:creationId xmlns:a16="http://schemas.microsoft.com/office/drawing/2014/main" id="{908CB2AD-A365-C101-8328-2DEDBFDB856B}"/>
               </a:ext>
             </a:extLst>
           </p:cNvPr>
@@ -4732,14 +5700,33 @@
           <a:bodyPr/>
           <a:lstStyle/>
           <a:p>
-            <a:endParaRPr lang="en-US"/>
+            <a:pPr marL="0" indent="0" algn="l">
+              <a:buNone/>
+            </a:pPr>
+            <a:r>
+              <a:rPr lang="en-US" b="0" i="0" dirty="0">
+                <a:solidFill>
+                  <a:srgbClr val="374151"/>
+                </a:solidFill>
+                <a:effectLst/>
+                <a:latin typeface="Söhne"/>
+              </a:rPr>
+              <a:t>Estimating the 3D shape of an object by analyzing the patterns and texture in its surface.</a:t>
+            </a:r>
+            <a:endParaRPr lang="en-DE" b="0" i="0" dirty="0">
+              <a:solidFill>
+                <a:srgbClr val="202124"/>
+              </a:solidFill>
+              <a:effectLst/>
+              <a:latin typeface="arial" panose="020B0604020202020204" pitchFamily="34" charset="0"/>
+            </a:endParaRPr>
           </a:p>
         </p:txBody>
       </p:sp>
     </p:spTree>
     <p:extLst>
       <p:ext uri="{BB962C8B-B14F-4D97-AF65-F5344CB8AC3E}">
-        <p14:creationId xmlns:p14="http://schemas.microsoft.com/office/powerpoint/2010/main" val="2638628651"/>
+        <p14:creationId xmlns:p14="http://schemas.microsoft.com/office/powerpoint/2010/main" val="2651181899"/>
       </p:ext>
     </p:extLst>
   </p:cSld>
@@ -4787,7 +5774,14 @@
           <a:bodyPr/>
           <a:lstStyle/>
           <a:p>
-            <a:endParaRPr lang="en-US"/>
+            <a:r>
+              <a:rPr lang="en-US" b="1" i="0" dirty="0">
+                <a:effectLst/>
+                <a:latin typeface="Söhne"/>
+              </a:rPr>
+              <a:t>Shape from Contour</a:t>
+            </a:r>
+            <a:endParaRPr lang="en-US" dirty="0"/>
           </a:p>
         </p:txBody>
       </p:sp>
@@ -4812,7 +5806,20 @@
           <a:bodyPr/>
           <a:lstStyle/>
           <a:p>
-            <a:endParaRPr lang="en-US"/>
+            <a:pPr marL="0" indent="0">
+              <a:buNone/>
+            </a:pPr>
+            <a:r>
+              <a:rPr lang="en-US" b="0" i="0" dirty="0">
+                <a:solidFill>
+                  <a:srgbClr val="374151"/>
+                </a:solidFill>
+                <a:effectLst/>
+                <a:latin typeface="Söhne"/>
+              </a:rPr>
+              <a:t>Reconstructing the 3D shape of an object by examining the edges and contours in an image.</a:t>
+            </a:r>
+            <a:endParaRPr lang="en-US" dirty="0"/>
           </a:p>
         </p:txBody>
       </p:sp>
@@ -4820,6 +5827,125 @@
     <p:extLst>
       <p:ext uri="{BB962C8B-B14F-4D97-AF65-F5344CB8AC3E}">
         <p14:creationId xmlns:p14="http://schemas.microsoft.com/office/powerpoint/2010/main" val="4044687740"/>
+      </p:ext>
+    </p:extLst>
+  </p:cSld>
+  <p:clrMapOvr>
+    <a:masterClrMapping/>
+  </p:clrMapOvr>
+</p:sld>
+</file>
+
+<file path=ppt/slides/slide9.xml><?xml version="1.0" encoding="utf-8"?>
+<p:sld xmlns:a="http://schemas.openxmlformats.org/drawingml/2006/main" xmlns:r="http://schemas.openxmlformats.org/officeDocument/2006/relationships" xmlns:p="http://schemas.openxmlformats.org/presentationml/2006/main">
+  <p:cSld>
+    <p:spTree>
+      <p:nvGrpSpPr>
+        <p:cNvPr id="1" name=""/>
+        <p:cNvGrpSpPr/>
+        <p:nvPr/>
+      </p:nvGrpSpPr>
+      <p:grpSpPr>
+        <a:xfrm>
+          <a:off x="0" y="0"/>
+          <a:ext cx="0" cy="0"/>
+          <a:chOff x="0" y="0"/>
+          <a:chExt cx="0" cy="0"/>
+        </a:xfrm>
+      </p:grpSpPr>
+      <p:sp>
+        <p:nvSpPr>
+          <p:cNvPr id="2" name="Title 1">
+            <a:extLst>
+              <a:ext uri="{FF2B5EF4-FFF2-40B4-BE49-F238E27FC236}">
+                <a16:creationId xmlns:a16="http://schemas.microsoft.com/office/drawing/2014/main" id="{89E9B7E6-207A-DDF2-EFF5-400A7EFAD0AB}"/>
+              </a:ext>
+            </a:extLst>
+          </p:cNvPr>
+          <p:cNvSpPr>
+            <a:spLocks noGrp="1"/>
+          </p:cNvSpPr>
+          <p:nvPr>
+            <p:ph type="title"/>
+          </p:nvPr>
+        </p:nvSpPr>
+        <p:spPr/>
+        <p:txBody>
+          <a:bodyPr/>
+          <a:lstStyle/>
+          <a:p>
+            <a:r>
+              <a:rPr lang="en-US" b="1" i="0" dirty="0">
+                <a:effectLst/>
+                <a:latin typeface="Söhne"/>
+              </a:rPr>
+              <a:t>Shape from Focus (</a:t>
+            </a:r>
+            <a:r>
+              <a:rPr lang="en-US" b="1" i="0" dirty="0" err="1">
+                <a:effectLst/>
+                <a:latin typeface="Söhne"/>
+              </a:rPr>
+              <a:t>SfF</a:t>
+            </a:r>
+            <a:r>
+              <a:rPr lang="en-US" b="1" i="0" dirty="0">
+                <a:effectLst/>
+                <a:latin typeface="Söhne"/>
+              </a:rPr>
+              <a:t>)</a:t>
+            </a:r>
+            <a:endParaRPr lang="en-US" dirty="0"/>
+          </a:p>
+        </p:txBody>
+      </p:sp>
+      <p:sp>
+        <p:nvSpPr>
+          <p:cNvPr id="3" name="Content Placeholder 2">
+            <a:extLst>
+              <a:ext uri="{FF2B5EF4-FFF2-40B4-BE49-F238E27FC236}">
+                <a16:creationId xmlns:a16="http://schemas.microsoft.com/office/drawing/2014/main" id="{661036DB-A74D-3EE5-E49C-B3203C85C913}"/>
+              </a:ext>
+            </a:extLst>
+          </p:cNvPr>
+          <p:cNvSpPr>
+            <a:spLocks noGrp="1"/>
+          </p:cNvSpPr>
+          <p:nvPr>
+            <p:ph idx="1"/>
+          </p:nvPr>
+        </p:nvSpPr>
+        <p:spPr/>
+        <p:txBody>
+          <a:bodyPr/>
+          <a:lstStyle/>
+          <a:p>
+            <a:pPr marL="0" indent="0">
+              <a:buNone/>
+            </a:pPr>
+            <a:r>
+              <a:rPr lang="en-US" b="0" i="0" dirty="0">
+                <a:solidFill>
+                  <a:srgbClr val="374151"/>
+                </a:solidFill>
+                <a:effectLst/>
+                <a:latin typeface="Söhne"/>
+              </a:rPr>
+              <a:t>Obtaining the 3D shape of an object by analyzing the variations in focus or depth of field in images.</a:t>
+            </a:r>
+          </a:p>
+          <a:p>
+            <a:pPr marL="0" indent="0">
+              <a:buNone/>
+            </a:pPr>
+            <a:endParaRPr lang="en-US" dirty="0"/>
+          </a:p>
+        </p:txBody>
+      </p:sp>
+    </p:spTree>
+    <p:extLst>
+      <p:ext uri="{BB962C8B-B14F-4D97-AF65-F5344CB8AC3E}">
+        <p14:creationId xmlns:p14="http://schemas.microsoft.com/office/powerpoint/2010/main" val="3936563433"/>
       </p:ext>
     </p:extLst>
   </p:cSld>

</xml_diff>